<commit_message>
fix typo, sts -> sls
</commit_message>
<xml_diff>
--- a/CYBER360-1.6-Interactive-CLI.pptx
+++ b/CYBER360-1.6-Interactive-CLI.pptx
@@ -130,61 +130,6 @@
 
 <file path=ppt/changesInfos/changesInfo1.xml><?xml version="1.0" encoding="utf-8"?>
 <pc:chgInfo xmlns:a="http://schemas.openxmlformats.org/drawingml/2006/main" xmlns:r="http://schemas.openxmlformats.org/officeDocument/2006/relationships" xmlns:ac="http://schemas.microsoft.com/office/drawing/2013/main/command" xmlns:pc="http://schemas.microsoft.com/office/powerpoint/2013/main/command">
-  <pc:docChgLst>
-    <pc:chgData name="Palmer, Jennifer" userId="04c8c1b4-349a-4c5d-8a68-5732467f309e" providerId="ADAL" clId="{F06F7416-AE39-4B53-98DF-CCE392FB41DF}"/>
-    <pc:docChg chg="modSld">
-      <pc:chgData name="Palmer, Jennifer" userId="04c8c1b4-349a-4c5d-8a68-5732467f309e" providerId="ADAL" clId="{F06F7416-AE39-4B53-98DF-CCE392FB41DF}" dt="2024-11-20T22:54:03.626" v="5" actId="1076"/>
-      <pc:docMkLst>
-        <pc:docMk/>
-      </pc:docMkLst>
-      <pc:sldChg chg="modSp mod">
-        <pc:chgData name="Palmer, Jennifer" userId="04c8c1b4-349a-4c5d-8a68-5732467f309e" providerId="ADAL" clId="{F06F7416-AE39-4B53-98DF-CCE392FB41DF}" dt="2024-11-20T22:54:03.626" v="5" actId="1076"/>
-        <pc:sldMkLst>
-          <pc:docMk/>
-          <pc:sldMk cId="3093343089" sldId="258"/>
-        </pc:sldMkLst>
-        <pc:spChg chg="mod">
-          <ac:chgData name="Palmer, Jennifer" userId="04c8c1b4-349a-4c5d-8a68-5732467f309e" providerId="ADAL" clId="{F06F7416-AE39-4B53-98DF-CCE392FB41DF}" dt="2024-11-20T22:54:03.626" v="5" actId="1076"/>
-          <ac:spMkLst>
-            <pc:docMk/>
-            <pc:sldMk cId="3093343089" sldId="258"/>
-            <ac:spMk id="2" creationId="{64492E64-A68B-8CA7-B3C6-044F7C8E76AB}"/>
-          </ac:spMkLst>
-        </pc:spChg>
-        <pc:spChg chg="mod">
-          <ac:chgData name="Palmer, Jennifer" userId="04c8c1b4-349a-4c5d-8a68-5732467f309e" providerId="ADAL" clId="{F06F7416-AE39-4B53-98DF-CCE392FB41DF}" dt="2024-11-20T22:53:56.864" v="4" actId="1076"/>
-          <ac:spMkLst>
-            <pc:docMk/>
-            <pc:sldMk cId="3093343089" sldId="258"/>
-            <ac:spMk id="4" creationId="{B64A8207-997F-319E-7F6D-676D3ECA779B}"/>
-          </ac:spMkLst>
-        </pc:spChg>
-      </pc:sldChg>
-      <pc:sldChg chg="modSp mod">
-        <pc:chgData name="Palmer, Jennifer" userId="04c8c1b4-349a-4c5d-8a68-5732467f309e" providerId="ADAL" clId="{F06F7416-AE39-4B53-98DF-CCE392FB41DF}" dt="2024-11-20T22:52:51.937" v="1" actId="1076"/>
-        <pc:sldMkLst>
-          <pc:docMk/>
-          <pc:sldMk cId="3904849878" sldId="259"/>
-        </pc:sldMkLst>
-        <pc:spChg chg="mod">
-          <ac:chgData name="Palmer, Jennifer" userId="04c8c1b4-349a-4c5d-8a68-5732467f309e" providerId="ADAL" clId="{F06F7416-AE39-4B53-98DF-CCE392FB41DF}" dt="2024-11-20T22:52:51.937" v="1" actId="1076"/>
-          <ac:spMkLst>
-            <pc:docMk/>
-            <pc:sldMk cId="3904849878" sldId="259"/>
-            <ac:spMk id="2" creationId="{64492E64-A68B-8CA7-B3C6-044F7C8E76AB}"/>
-          </ac:spMkLst>
-        </pc:spChg>
-        <pc:spChg chg="mod">
-          <ac:chgData name="Palmer, Jennifer" userId="04c8c1b4-349a-4c5d-8a68-5732467f309e" providerId="ADAL" clId="{F06F7416-AE39-4B53-98DF-CCE392FB41DF}" dt="2024-11-20T22:52:48.045" v="0" actId="1076"/>
-          <ac:spMkLst>
-            <pc:docMk/>
-            <pc:sldMk cId="3904849878" sldId="259"/>
-            <ac:spMk id="4" creationId="{B64A8207-997F-319E-7F6D-676D3ECA779B}"/>
-          </ac:spMkLst>
-        </pc:spChg>
-      </pc:sldChg>
-    </pc:docChg>
-  </pc:docChgLst>
   <pc:docChgLst>
     <pc:chgData name="Talbert, Matthew" userId="877a4118-3f16-4ac9-a72c-5dd2c7b28c85" providerId="ADAL" clId="{542DF80E-0BAB-49BE-8038-A8F3A0DA3938}"/>
     <pc:docChg chg="undo redo custSel modSld">
@@ -586,6 +531,61 @@
       </pc:sldChg>
     </pc:docChg>
   </pc:docChgLst>
+  <pc:docChgLst>
+    <pc:chgData name="Palmer, Jennifer" userId="04c8c1b4-349a-4c5d-8a68-5732467f309e" providerId="ADAL" clId="{F06F7416-AE39-4B53-98DF-CCE392FB41DF}"/>
+    <pc:docChg chg="modSld">
+      <pc:chgData name="Palmer, Jennifer" userId="04c8c1b4-349a-4c5d-8a68-5732467f309e" providerId="ADAL" clId="{F06F7416-AE39-4B53-98DF-CCE392FB41DF}" dt="2024-11-20T22:54:03.626" v="5" actId="1076"/>
+      <pc:docMkLst>
+        <pc:docMk/>
+      </pc:docMkLst>
+      <pc:sldChg chg="modSp mod">
+        <pc:chgData name="Palmer, Jennifer" userId="04c8c1b4-349a-4c5d-8a68-5732467f309e" providerId="ADAL" clId="{F06F7416-AE39-4B53-98DF-CCE392FB41DF}" dt="2024-11-20T22:54:03.626" v="5" actId="1076"/>
+        <pc:sldMkLst>
+          <pc:docMk/>
+          <pc:sldMk cId="3093343089" sldId="258"/>
+        </pc:sldMkLst>
+        <pc:spChg chg="mod">
+          <ac:chgData name="Palmer, Jennifer" userId="04c8c1b4-349a-4c5d-8a68-5732467f309e" providerId="ADAL" clId="{F06F7416-AE39-4B53-98DF-CCE392FB41DF}" dt="2024-11-20T22:54:03.626" v="5" actId="1076"/>
+          <ac:spMkLst>
+            <pc:docMk/>
+            <pc:sldMk cId="3093343089" sldId="258"/>
+            <ac:spMk id="2" creationId="{64492E64-A68B-8CA7-B3C6-044F7C8E76AB}"/>
+          </ac:spMkLst>
+        </pc:spChg>
+        <pc:spChg chg="mod">
+          <ac:chgData name="Palmer, Jennifer" userId="04c8c1b4-349a-4c5d-8a68-5732467f309e" providerId="ADAL" clId="{F06F7416-AE39-4B53-98DF-CCE392FB41DF}" dt="2024-11-20T22:53:56.864" v="4" actId="1076"/>
+          <ac:spMkLst>
+            <pc:docMk/>
+            <pc:sldMk cId="3093343089" sldId="258"/>
+            <ac:spMk id="4" creationId="{B64A8207-997F-319E-7F6D-676D3ECA779B}"/>
+          </ac:spMkLst>
+        </pc:spChg>
+      </pc:sldChg>
+      <pc:sldChg chg="modSp mod">
+        <pc:chgData name="Palmer, Jennifer" userId="04c8c1b4-349a-4c5d-8a68-5732467f309e" providerId="ADAL" clId="{F06F7416-AE39-4B53-98DF-CCE392FB41DF}" dt="2024-11-20T22:52:51.937" v="1" actId="1076"/>
+        <pc:sldMkLst>
+          <pc:docMk/>
+          <pc:sldMk cId="3904849878" sldId="259"/>
+        </pc:sldMkLst>
+        <pc:spChg chg="mod">
+          <ac:chgData name="Palmer, Jennifer" userId="04c8c1b4-349a-4c5d-8a68-5732467f309e" providerId="ADAL" clId="{F06F7416-AE39-4B53-98DF-CCE392FB41DF}" dt="2024-11-20T22:52:51.937" v="1" actId="1076"/>
+          <ac:spMkLst>
+            <pc:docMk/>
+            <pc:sldMk cId="3904849878" sldId="259"/>
+            <ac:spMk id="2" creationId="{64492E64-A68B-8CA7-B3C6-044F7C8E76AB}"/>
+          </ac:spMkLst>
+        </pc:spChg>
+        <pc:spChg chg="mod">
+          <ac:chgData name="Palmer, Jennifer" userId="04c8c1b4-349a-4c5d-8a68-5732467f309e" providerId="ADAL" clId="{F06F7416-AE39-4B53-98DF-CCE392FB41DF}" dt="2024-11-20T22:52:48.045" v="0" actId="1076"/>
+          <ac:spMkLst>
+            <pc:docMk/>
+            <pc:sldMk cId="3904849878" sldId="259"/>
+            <ac:spMk id="4" creationId="{B64A8207-997F-319E-7F6D-676D3ECA779B}"/>
+          </ac:spMkLst>
+        </pc:spChg>
+      </pc:sldChg>
+    </pc:docChg>
+  </pc:docChgLst>
 </pc:chgInfo>
 </file>
 
@@ -768,7 +768,7 @@
           <a:p>
             <a:fld id="{71087A05-F855-4434-8DDE-39A8542098A6}" type="datetimeFigureOut">
               <a:rPr lang="en-US" smtClean="0"/>
-              <a:t>11/21/2024</a:t>
+              <a:t>2/8/2025</a:t>
             </a:fld>
             <a:endParaRPr lang="en-US"/>
           </a:p>
@@ -1006,7 +1006,7 @@
           <a:p>
             <a:fld id="{71087A05-F855-4434-8DDE-39A8542098A6}" type="datetimeFigureOut">
               <a:rPr lang="en-US" smtClean="0"/>
-              <a:t>11/21/2024</a:t>
+              <a:t>2/8/2025</a:t>
             </a:fld>
             <a:endParaRPr lang="en-US"/>
           </a:p>
@@ -1242,7 +1242,7 @@
           <a:p>
             <a:fld id="{0BE24BAF-58C0-4D38-ABA0-4170CC92DC13}" type="datetimeFigureOut">
               <a:rPr lang="en-US" smtClean="0"/>
-              <a:t>11/21/2024</a:t>
+              <a:t>2/8/2025</a:t>
             </a:fld>
             <a:endParaRPr lang="en-US"/>
           </a:p>
@@ -1545,7 +1545,7 @@
           <a:p>
             <a:fld id="{71087A05-F855-4434-8DDE-39A8542098A6}" type="datetimeFigureOut">
               <a:rPr lang="en-US" smtClean="0"/>
-              <a:t>11/21/2024</a:t>
+              <a:t>2/8/2025</a:t>
             </a:fld>
             <a:endParaRPr lang="en-US"/>
           </a:p>
@@ -1850,7 +1850,7 @@
           <a:p>
             <a:fld id="{71087A05-F855-4434-8DDE-39A8542098A6}" type="datetimeFigureOut">
               <a:rPr lang="en-US" smtClean="0"/>
-              <a:t>11/21/2024</a:t>
+              <a:t>2/8/2025</a:t>
             </a:fld>
             <a:endParaRPr lang="en-US"/>
           </a:p>
@@ -2153,7 +2153,7 @@
           <a:p>
             <a:fld id="{71087A05-F855-4434-8DDE-39A8542098A6}" type="datetimeFigureOut">
               <a:rPr lang="en-US" smtClean="0"/>
-              <a:t>11/21/2024</a:t>
+              <a:t>2/8/2025</a:t>
             </a:fld>
             <a:endParaRPr lang="en-US"/>
           </a:p>
@@ -2604,7 +2604,7 @@
           <a:p>
             <a:fld id="{71087A05-F855-4434-8DDE-39A8542098A6}" type="datetimeFigureOut">
               <a:rPr lang="en-US" smtClean="0"/>
-              <a:t>11/21/2024</a:t>
+              <a:t>2/8/2025</a:t>
             </a:fld>
             <a:endParaRPr lang="en-US"/>
           </a:p>
@@ -2777,7 +2777,7 @@
           <a:p>
             <a:fld id="{71087A05-F855-4434-8DDE-39A8542098A6}" type="datetimeFigureOut">
               <a:rPr lang="en-US" smtClean="0"/>
-              <a:t>11/21/2024</a:t>
+              <a:t>2/8/2025</a:t>
             </a:fld>
             <a:endParaRPr lang="en-US"/>
           </a:p>
@@ -2914,7 +2914,7 @@
           <a:p>
             <a:fld id="{71087A05-F855-4434-8DDE-39A8542098A6}" type="datetimeFigureOut">
               <a:rPr lang="en-US" smtClean="0"/>
-              <a:t>11/21/2024</a:t>
+              <a:t>2/8/2025</a:t>
             </a:fld>
             <a:endParaRPr lang="en-US"/>
           </a:p>
@@ -3258,7 +3258,7 @@
           <a:p>
             <a:fld id="{71087A05-F855-4434-8DDE-39A8542098A6}" type="datetimeFigureOut">
               <a:rPr lang="en-US" smtClean="0"/>
-              <a:t>11/21/2024</a:t>
+              <a:t>2/8/2025</a:t>
             </a:fld>
             <a:endParaRPr lang="en-US"/>
           </a:p>
@@ -3582,7 +3582,7 @@
           <a:p>
             <a:fld id="{71087A05-F855-4434-8DDE-39A8542098A6}" type="datetimeFigureOut">
               <a:rPr lang="en-US" smtClean="0"/>
-              <a:t>11/21/2024</a:t>
+              <a:t>2/8/2025</a:t>
             </a:fld>
             <a:endParaRPr lang="en-US"/>
           </a:p>
@@ -8240,10 +8240,10 @@
               <a:t>h | </a:t>
             </a:r>
             <a:r>
-              <a:rPr lang="en-US" sz="2000" dirty="0" err="1">
-                <a:latin typeface="Lucida Console" panose="020B0609040504020204" pitchFamily="49" charset="0"/>
-              </a:rPr>
-              <a:t>sts</a:t>
+              <a:rPr lang="en-US" sz="2000">
+                <a:latin typeface="Lucida Console" panose="020B0609040504020204" pitchFamily="49" charset="0"/>
+              </a:rPr>
+              <a:t>sls</a:t>
             </a:r>
             <a:r>
               <a:rPr lang="en-US" sz="2000" dirty="0">

</xml_diff>